<commit_message>
More JobData in backend and more app.py
</commit_message>
<xml_diff>
--- a/Presentation/Oxygen Logo Creation.pptx
+++ b/Presentation/Oxygen Logo Creation.pptx
@@ -9,6 +9,7 @@
     <p:sldId id="259" r:id="rId3"/>
     <p:sldId id="257" r:id="rId4"/>
     <p:sldId id="258" r:id="rId5"/>
+    <p:sldId id="260" r:id="rId6"/>
   </p:sldIdLst>
   <p:sldSz cx="12192000" cy="6858000"/>
   <p:notesSz cx="6858000" cy="9144000"/>
@@ -3461,19 +3462,9 @@
   <p:cSld>
     <p:bg>
       <p:bgPr>
-        <a:gradFill>
-          <a:gsLst>
-            <a:gs pos="4000">
-              <a:schemeClr val="bg1"/>
-            </a:gs>
-            <a:gs pos="100000">
-              <a:schemeClr val="bg1">
-                <a:lumMod val="95000"/>
-              </a:schemeClr>
-            </a:gs>
-          </a:gsLst>
-          <a:lin ang="8100000" scaled="1"/>
-        </a:gradFill>
+        <a:solidFill>
+          <a:schemeClr val="bg1"/>
+        </a:solidFill>
         <a:effectLst/>
       </p:bgPr>
     </p:bg>
@@ -3493,6 +3484,410 @@
       </p:grpSpPr>
       <p:sp>
         <p:nvSpPr>
+          <p:cNvPr id="11" name="Rectangle 10">
+            <a:extLst>
+              <a:ext uri="{FF2B5EF4-FFF2-40B4-BE49-F238E27FC236}">
+                <a16:creationId xmlns:a16="http://schemas.microsoft.com/office/drawing/2014/main" id="{86FF76B9-219D-4469-AF87-0236D29032F1}"/>
+              </a:ext>
+              <a:ext uri="{C183D7F6-B498-43B3-948B-1728B52AA6E4}">
+                <adec:decorative xmlns:adec="http://schemas.microsoft.com/office/drawing/2017/decorative" val="1"/>
+              </a:ext>
+            </a:extLst>
+          </p:cNvPr>
+          <p:cNvSpPr>
+            <a:spLocks noGrp="1" noRot="1" noChangeAspect="1" noMove="1" noResize="1" noEditPoints="1" noAdjustHandles="1" noChangeArrowheads="1" noChangeShapeType="1" noTextEdit="1"/>
+          </p:cNvSpPr>
+          <p:nvPr>
+            <p:extLst>
+              <p:ext uri="{386F3935-93C4-4BCD-93E2-E3B085C9AB24}">
+                <p16:designElem xmlns:p16="http://schemas.microsoft.com/office/powerpoint/2015/main" val="1"/>
+              </p:ext>
+            </p:extLst>
+          </p:nvPr>
+        </p:nvSpPr>
+        <p:spPr>
+          <a:xfrm>
+            <a:off x="0" y="0"/>
+            <a:ext cx="12192000" cy="6858000"/>
+          </a:xfrm>
+          <a:prstGeom prst="rect">
+            <a:avLst/>
+          </a:prstGeom>
+          <a:solidFill>
+            <a:schemeClr val="bg1"/>
+          </a:solidFill>
+          <a:ln>
+            <a:noFill/>
+          </a:ln>
+        </p:spPr>
+        <p:style>
+          <a:lnRef idx="2">
+            <a:schemeClr val="accent1">
+              <a:shade val="50000"/>
+            </a:schemeClr>
+          </a:lnRef>
+          <a:fillRef idx="1">
+            <a:schemeClr val="accent1"/>
+          </a:fillRef>
+          <a:effectRef idx="0">
+            <a:schemeClr val="accent1"/>
+          </a:effectRef>
+          <a:fontRef idx="minor">
+            <a:schemeClr val="lt1"/>
+          </a:fontRef>
+        </p:style>
+        <p:txBody>
+          <a:bodyPr rtlCol="0" anchor="ctr"/>
+          <a:lstStyle/>
+          <a:p>
+            <a:pPr algn="ctr"/>
+            <a:endParaRPr lang="en-US" dirty="0"/>
+          </a:p>
+        </p:txBody>
+      </p:sp>
+      <p:grpSp>
+        <p:nvGrpSpPr>
+          <p:cNvPr id="13" name="Group 12">
+            <a:extLst>
+              <a:ext uri="{FF2B5EF4-FFF2-40B4-BE49-F238E27FC236}">
+                <a16:creationId xmlns:a16="http://schemas.microsoft.com/office/drawing/2014/main" id="{DB88BD78-87E1-424D-B479-C37D8E41B12E}"/>
+              </a:ext>
+              <a:ext uri="{C183D7F6-B498-43B3-948B-1728B52AA6E4}">
+                <adec:decorative xmlns:adec="http://schemas.microsoft.com/office/drawing/2017/decorative" val="1"/>
+              </a:ext>
+            </a:extLst>
+          </p:cNvPr>
+          <p:cNvGrpSpPr>
+            <a:grpSpLocks noGrp="1" noUngrp="1" noRot="1" noChangeAspect="1" noMove="1" noResize="1"/>
+          </p:cNvGrpSpPr>
+          <p:nvPr>
+            <p:extLst>
+              <p:ext uri="{386F3935-93C4-4BCD-93E2-E3B085C9AB24}">
+                <p16:designElem xmlns:p16="http://schemas.microsoft.com/office/powerpoint/2015/main" val="1"/>
+              </p:ext>
+            </p:extLst>
+          </p:nvPr>
+        </p:nvGrpSpPr>
+        <p:grpSpPr>
+          <a:xfrm flipH="1">
+            <a:off x="10964637" y="2358"/>
+            <a:ext cx="1876653" cy="1766008"/>
+            <a:chOff x="-648769" y="2358"/>
+            <a:chExt cx="1876653" cy="1766008"/>
+          </a:xfrm>
+        </p:grpSpPr>
+        <p:sp>
+          <p:nvSpPr>
+            <p:cNvPr id="14" name="Freeform: Shape 13">
+              <a:extLst>
+                <a:ext uri="{FF2B5EF4-FFF2-40B4-BE49-F238E27FC236}">
+                  <a16:creationId xmlns:a16="http://schemas.microsoft.com/office/drawing/2014/main" id="{C05EB894-9410-4B20-95E4-7A25101AB895}"/>
+                </a:ext>
+                <a:ext uri="{C183D7F6-B498-43B3-948B-1728B52AA6E4}">
+                  <adec:decorative xmlns:adec="http://schemas.microsoft.com/office/drawing/2017/decorative" val="1"/>
+                </a:ext>
+              </a:extLst>
+            </p:cNvPr>
+            <p:cNvSpPr/>
+            <p:nvPr>
+              <p:extLst>
+                <p:ext uri="{386F3935-93C4-4BCD-93E2-E3B085C9AB24}">
+                  <p16:designElem xmlns:p16="http://schemas.microsoft.com/office/powerpoint/2015/main" val="1"/>
+                </p:ext>
+              </p:extLst>
+            </p:nvPr>
+          </p:nvSpPr>
+          <p:spPr>
+            <a:xfrm rot="2700000">
+              <a:off x="-415188" y="-231223"/>
+              <a:ext cx="1409491" cy="1876653"/>
+            </a:xfrm>
+            <a:custGeom>
+              <a:avLst/>
+              <a:gdLst>
+                <a:gd name="connsiteX0" fmla="*/ 0 w 1409491"/>
+                <a:gd name="connsiteY0" fmla="*/ 643075 h 1876653"/>
+                <a:gd name="connsiteX1" fmla="*/ 643075 w 1409491"/>
+                <a:gd name="connsiteY1" fmla="*/ 0 h 1876653"/>
+                <a:gd name="connsiteX2" fmla="*/ 1409491 w 1409491"/>
+                <a:gd name="connsiteY2" fmla="*/ 0 h 1876653"/>
+                <a:gd name="connsiteX3" fmla="*/ 1409491 w 1409491"/>
+                <a:gd name="connsiteY3" fmla="*/ 1876653 h 1876653"/>
+                <a:gd name="connsiteX4" fmla="*/ 1233578 w 1409491"/>
+                <a:gd name="connsiteY4" fmla="*/ 1876653 h 1876653"/>
+              </a:gdLst>
+              <a:ahLst/>
+              <a:cxnLst>
+                <a:cxn ang="0">
+                  <a:pos x="connsiteX0" y="connsiteY0"/>
+                </a:cxn>
+                <a:cxn ang="0">
+                  <a:pos x="connsiteX1" y="connsiteY1"/>
+                </a:cxn>
+                <a:cxn ang="0">
+                  <a:pos x="connsiteX2" y="connsiteY2"/>
+                </a:cxn>
+                <a:cxn ang="0">
+                  <a:pos x="connsiteX3" y="connsiteY3"/>
+                </a:cxn>
+                <a:cxn ang="0">
+                  <a:pos x="connsiteX4" y="connsiteY4"/>
+                </a:cxn>
+              </a:cxnLst>
+              <a:rect l="l" t="t" r="r" b="b"/>
+              <a:pathLst>
+                <a:path w="1409491" h="1876653">
+                  <a:moveTo>
+                    <a:pt x="0" y="643075"/>
+                  </a:moveTo>
+                  <a:lnTo>
+                    <a:pt x="643075" y="0"/>
+                  </a:lnTo>
+                  <a:lnTo>
+                    <a:pt x="1409491" y="0"/>
+                  </a:lnTo>
+                  <a:lnTo>
+                    <a:pt x="1409491" y="1876653"/>
+                  </a:lnTo>
+                  <a:lnTo>
+                    <a:pt x="1233578" y="1876653"/>
+                  </a:lnTo>
+                  <a:close/>
+                </a:path>
+              </a:pathLst>
+            </a:custGeom>
+            <a:solidFill>
+              <a:schemeClr val="accent1">
+                <a:alpha val="30000"/>
+              </a:schemeClr>
+            </a:solidFill>
+            <a:ln>
+              <a:noFill/>
+            </a:ln>
+          </p:spPr>
+          <p:style>
+            <a:lnRef idx="2">
+              <a:schemeClr val="accent1">
+                <a:shade val="50000"/>
+              </a:schemeClr>
+            </a:lnRef>
+            <a:fillRef idx="1">
+              <a:schemeClr val="accent1"/>
+            </a:fillRef>
+            <a:effectRef idx="0">
+              <a:schemeClr val="accent1"/>
+            </a:effectRef>
+            <a:fontRef idx="minor">
+              <a:schemeClr val="lt1"/>
+            </a:fontRef>
+          </p:style>
+          <p:txBody>
+            <a:bodyPr rtlCol="0" anchor="ctr"/>
+            <a:lstStyle/>
+            <a:p>
+              <a:pPr algn="ctr"/>
+              <a:endParaRPr lang="en-US"/>
+            </a:p>
+          </p:txBody>
+        </p:sp>
+        <p:sp>
+          <p:nvSpPr>
+            <p:cNvPr id="15" name="Rectangle 14">
+              <a:extLst>
+                <a:ext uri="{FF2B5EF4-FFF2-40B4-BE49-F238E27FC236}">
+                  <a16:creationId xmlns:a16="http://schemas.microsoft.com/office/drawing/2014/main" id="{166E38B6-B050-4340-8E8F-3A971DADC031}"/>
+                </a:ext>
+                <a:ext uri="{C183D7F6-B498-43B3-948B-1728B52AA6E4}">
+                  <adec:decorative xmlns:adec="http://schemas.microsoft.com/office/drawing/2017/decorative" val="1"/>
+                </a:ext>
+              </a:extLst>
+            </p:cNvPr>
+            <p:cNvSpPr/>
+            <p:nvPr>
+              <p:extLst>
+                <p:ext uri="{386F3935-93C4-4BCD-93E2-E3B085C9AB24}">
+                  <p16:designElem xmlns:p16="http://schemas.microsoft.com/office/powerpoint/2015/main" val="1"/>
+                </p:ext>
+              </p:extLst>
+            </p:nvPr>
+          </p:nvSpPr>
+          <p:spPr>
+            <a:xfrm rot="2700000">
+              <a:off x="301285" y="1282788"/>
+              <a:ext cx="485578" cy="485578"/>
+            </a:xfrm>
+            <a:prstGeom prst="rect">
+              <a:avLst/>
+            </a:prstGeom>
+            <a:solidFill>
+              <a:schemeClr val="accent1">
+                <a:alpha val="30000"/>
+              </a:schemeClr>
+            </a:solidFill>
+            <a:ln>
+              <a:noFill/>
+            </a:ln>
+          </p:spPr>
+          <p:style>
+            <a:lnRef idx="2">
+              <a:schemeClr val="accent1">
+                <a:shade val="50000"/>
+              </a:schemeClr>
+            </a:lnRef>
+            <a:fillRef idx="1">
+              <a:schemeClr val="accent1"/>
+            </a:fillRef>
+            <a:effectRef idx="0">
+              <a:schemeClr val="accent1"/>
+            </a:effectRef>
+            <a:fontRef idx="minor">
+              <a:schemeClr val="lt1"/>
+            </a:fontRef>
+          </p:style>
+          <p:txBody>
+            <a:bodyPr rtlCol="0" anchor="ctr"/>
+            <a:lstStyle/>
+            <a:p>
+              <a:pPr algn="ctr"/>
+              <a:endParaRPr lang="en-US"/>
+            </a:p>
+          </p:txBody>
+        </p:sp>
+      </p:grpSp>
+      <p:sp>
+        <p:nvSpPr>
+          <p:cNvPr id="17" name="Rectangle 16">
+            <a:extLst>
+              <a:ext uri="{FF2B5EF4-FFF2-40B4-BE49-F238E27FC236}">
+                <a16:creationId xmlns:a16="http://schemas.microsoft.com/office/drawing/2014/main" id="{2E80C965-DB6D-4F81-9E9E-B027384D0BD6}"/>
+              </a:ext>
+              <a:ext uri="{C183D7F6-B498-43B3-948B-1728B52AA6E4}">
+                <adec:decorative xmlns:adec="http://schemas.microsoft.com/office/drawing/2017/decorative" val="1"/>
+              </a:ext>
+            </a:extLst>
+          </p:cNvPr>
+          <p:cNvSpPr>
+            <a:spLocks noGrp="1" noRot="1" noChangeAspect="1" noMove="1" noResize="1" noEditPoints="1" noAdjustHandles="1" noChangeArrowheads="1" noChangeShapeType="1" noTextEdit="1"/>
+          </p:cNvSpPr>
+          <p:nvPr>
+            <p:extLst>
+              <p:ext uri="{386F3935-93C4-4BCD-93E2-E3B085C9AB24}">
+                <p16:designElem xmlns:p16="http://schemas.microsoft.com/office/powerpoint/2015/main" val="1"/>
+              </p:ext>
+            </p:extLst>
+          </p:nvPr>
+        </p:nvSpPr>
+        <p:spPr>
+          <a:xfrm rot="2700000">
+            <a:off x="2737196" y="6033666"/>
+            <a:ext cx="645368" cy="645368"/>
+          </a:xfrm>
+          <a:prstGeom prst="rect">
+            <a:avLst/>
+          </a:prstGeom>
+          <a:solidFill>
+            <a:schemeClr val="accent4">
+              <a:alpha val="30000"/>
+            </a:schemeClr>
+          </a:solidFill>
+          <a:ln>
+            <a:noFill/>
+          </a:ln>
+        </p:spPr>
+        <p:style>
+          <a:lnRef idx="2">
+            <a:schemeClr val="accent1">
+              <a:shade val="50000"/>
+            </a:schemeClr>
+          </a:lnRef>
+          <a:fillRef idx="1">
+            <a:schemeClr val="accent1"/>
+          </a:fillRef>
+          <a:effectRef idx="0">
+            <a:schemeClr val="accent1"/>
+          </a:effectRef>
+          <a:fontRef idx="minor">
+            <a:schemeClr val="lt1"/>
+          </a:fontRef>
+        </p:style>
+        <p:txBody>
+          <a:bodyPr rtlCol="0" anchor="ctr"/>
+          <a:lstStyle/>
+          <a:p>
+            <a:pPr algn="ctr"/>
+            <a:endParaRPr lang="en-US"/>
+          </a:p>
+        </p:txBody>
+      </p:sp>
+      <p:sp>
+        <p:nvSpPr>
+          <p:cNvPr id="19" name="Isosceles Triangle 18">
+            <a:extLst>
+              <a:ext uri="{FF2B5EF4-FFF2-40B4-BE49-F238E27FC236}">
+                <a16:creationId xmlns:a16="http://schemas.microsoft.com/office/drawing/2014/main" id="{633C5E46-DAC5-4661-9C87-22B08E2A512F}"/>
+              </a:ext>
+              <a:ext uri="{C183D7F6-B498-43B3-948B-1728B52AA6E4}">
+                <adec:decorative xmlns:adec="http://schemas.microsoft.com/office/drawing/2017/decorative" val="1"/>
+              </a:ext>
+            </a:extLst>
+          </p:cNvPr>
+          <p:cNvSpPr>
+            <a:spLocks noGrp="1" noRot="1" noChangeAspect="1" noMove="1" noResize="1" noEditPoints="1" noAdjustHandles="1" noChangeArrowheads="1" noChangeShapeType="1" noTextEdit="1"/>
+          </p:cNvSpPr>
+          <p:nvPr>
+            <p:extLst>
+              <p:ext uri="{386F3935-93C4-4BCD-93E2-E3B085C9AB24}">
+                <p16:designElem xmlns:p16="http://schemas.microsoft.com/office/powerpoint/2015/main" val="1"/>
+              </p:ext>
+            </p:extLst>
+          </p:nvPr>
+        </p:nvSpPr>
+        <p:spPr>
+          <a:xfrm>
+            <a:off x="1343436" y="5721108"/>
+            <a:ext cx="2261965" cy="1136891"/>
+          </a:xfrm>
+          <a:prstGeom prst="triangle">
+            <a:avLst>
+              <a:gd name="adj" fmla="val 50000"/>
+            </a:avLst>
+          </a:prstGeom>
+          <a:solidFill>
+            <a:schemeClr val="accent4">
+              <a:alpha val="30000"/>
+            </a:schemeClr>
+          </a:solidFill>
+          <a:ln>
+            <a:noFill/>
+          </a:ln>
+        </p:spPr>
+        <p:style>
+          <a:lnRef idx="2">
+            <a:schemeClr val="accent1">
+              <a:shade val="50000"/>
+            </a:schemeClr>
+          </a:lnRef>
+          <a:fillRef idx="1">
+            <a:schemeClr val="accent1"/>
+          </a:fillRef>
+          <a:effectRef idx="0">
+            <a:schemeClr val="accent1"/>
+          </a:effectRef>
+          <a:fontRef idx="minor">
+            <a:schemeClr val="lt1"/>
+          </a:fontRef>
+        </p:style>
+        <p:txBody>
+          <a:bodyPr rtlCol="0" anchor="ctr"/>
+          <a:lstStyle/>
+          <a:p>
+            <a:pPr algn="ctr"/>
+            <a:endParaRPr lang="en-US"/>
+          </a:p>
+        </p:txBody>
+      </p:sp>
+      <p:sp>
+        <p:nvSpPr>
           <p:cNvPr id="6" name="Rounded Rectangle 5">
             <a:extLst>
               <a:ext uri="{FF2B5EF4-FFF2-40B4-BE49-F238E27FC236}">
@@ -3505,8 +3900,8 @@
         </p:nvSpPr>
         <p:spPr>
           <a:xfrm>
-            <a:off x="4155311" y="1394234"/>
-            <a:ext cx="3889094" cy="3964844"/>
+            <a:off x="3363686" y="643467"/>
+            <a:ext cx="5464627" cy="5571065"/>
           </a:xfrm>
           <a:prstGeom prst="roundRect">
             <a:avLst>
@@ -3576,8 +3971,8 @@
         </p:nvSpPr>
         <p:spPr>
           <a:xfrm>
-            <a:off x="4609475" y="1886055"/>
-            <a:ext cx="2973049" cy="2973049"/>
+            <a:off x="4001839" y="1334532"/>
+            <a:ext cx="4177478" cy="4177478"/>
           </a:xfrm>
           <a:prstGeom prst="donut">
             <a:avLst>
@@ -3634,8 +4029,8 @@
         </p:nvSpPr>
         <p:spPr>
           <a:xfrm>
-            <a:off x="5139828" y="2875460"/>
-            <a:ext cx="1045580" cy="1045580"/>
+            <a:off x="4747046" y="2724761"/>
+            <a:ext cx="1469161" cy="1469161"/>
           </a:xfrm>
           <a:prstGeom prst="donut">
             <a:avLst>
@@ -3708,686 +4103,752 @@
           <a:chExt cx="0" cy="0"/>
         </a:xfrm>
       </p:grpSpPr>
-      <p:sp>
-        <p:nvSpPr>
-          <p:cNvPr id="31" name="Rounded Rectangle 30">
-            <a:extLst>
-              <a:ext uri="{FF2B5EF4-FFF2-40B4-BE49-F238E27FC236}">
-                <a16:creationId xmlns:a16="http://schemas.microsoft.com/office/drawing/2014/main" id="{2F364721-9750-67E8-871A-CB0CE99A9221}"/>
-              </a:ext>
-            </a:extLst>
-          </p:cNvPr>
-          <p:cNvSpPr/>
+      <p:pic>
+        <p:nvPicPr>
+          <p:cNvPr id="35" name="Picture 4" descr="Change the language on your iPhone or iPad - Apple Support">
+            <a:extLst>
+              <a:ext uri="{FF2B5EF4-FFF2-40B4-BE49-F238E27FC236}">
+                <a16:creationId xmlns:a16="http://schemas.microsoft.com/office/drawing/2014/main" id="{376FDFAF-96AF-34BD-159D-65D8220B0273}"/>
+              </a:ext>
+            </a:extLst>
+          </p:cNvPr>
+          <p:cNvPicPr>
+            <a:picLocks noChangeAspect="1" noChangeArrowheads="1"/>
+          </p:cNvPicPr>
           <p:nvPr/>
-        </p:nvSpPr>
-        <p:spPr>
+        </p:nvPicPr>
+        <p:blipFill rotWithShape="1">
+          <a:blip r:embed="rId2">
+            <a:extLst>
+              <a:ext uri="{28A0092B-C50C-407E-A947-70E740481C1C}">
+                <a14:useLocalDpi xmlns:a14="http://schemas.microsoft.com/office/drawing/2010/main" val="0"/>
+              </a:ext>
+            </a:extLst>
+          </a:blip>
+          <a:srcRect l="63725" t="37781" r="10692" b="43407"/>
+          <a:stretch/>
+        </p:blipFill>
+        <p:spPr bwMode="auto">
           <a:xfrm>
-            <a:off x="4155311" y="1394234"/>
-            <a:ext cx="3889094" cy="3964844"/>
+            <a:off x="2894945" y="511628"/>
+            <a:ext cx="4866569" cy="6490035"/>
           </a:xfrm>
-          <a:prstGeom prst="roundRect">
-            <a:avLst>
-              <a:gd name="adj" fmla="val 10919"/>
-            </a:avLst>
-          </a:prstGeom>
-          <a:gradFill flip="none" rotWithShape="1">
-            <a:gsLst>
-              <a:gs pos="50000">
-                <a:srgbClr val="2B4091">
-                  <a:lumMod val="76260"/>
-                  <a:lumOff val="23740"/>
-                </a:srgbClr>
-              </a:gs>
-              <a:gs pos="67000">
-                <a:srgbClr val="00B0F0">
-                  <a:lumMod val="51000"/>
-                  <a:lumOff val="49000"/>
-                </a:srgbClr>
-              </a:gs>
-            </a:gsLst>
-            <a:path path="circle">
-              <a:fillToRect l="50000" t="50000" r="50000" b="50000"/>
-            </a:path>
-            <a:tileRect/>
-          </a:gradFill>
-          <a:ln>
-            <a:noFill/>
-          </a:ln>
-        </p:spPr>
-        <p:style>
-          <a:lnRef idx="2">
-            <a:schemeClr val="accent1">
-              <a:shade val="15000"/>
-            </a:schemeClr>
-          </a:lnRef>
-          <a:fillRef idx="1">
-            <a:schemeClr val="accent1"/>
-          </a:fillRef>
-          <a:effectRef idx="0">
-            <a:schemeClr val="accent1"/>
-          </a:effectRef>
-          <a:fontRef idx="minor">
-            <a:schemeClr val="lt1"/>
-          </a:fontRef>
-        </p:style>
-        <p:txBody>
-          <a:bodyPr rtlCol="0" anchor="ctr"/>
-          <a:lstStyle/>
-          <a:p>
-            <a:pPr algn="ctr"/>
-            <a:endParaRPr lang="en-US"/>
-          </a:p>
-        </p:txBody>
-      </p:sp>
-      <p:sp>
-        <p:nvSpPr>
-          <p:cNvPr id="4" name="Donut 3">
-            <a:extLst>
-              <a:ext uri="{FF2B5EF4-FFF2-40B4-BE49-F238E27FC236}">
-                <a16:creationId xmlns:a16="http://schemas.microsoft.com/office/drawing/2014/main" id="{9919C964-9511-837C-F423-1DDA95B2E374}"/>
-              </a:ext>
-            </a:extLst>
-          </p:cNvPr>
-          <p:cNvSpPr/>
-          <p:nvPr/>
-        </p:nvSpPr>
-        <p:spPr>
-          <a:xfrm>
-            <a:off x="4609475" y="1886055"/>
-            <a:ext cx="2973049" cy="2973049"/>
-          </a:xfrm>
-          <a:prstGeom prst="donut">
-            <a:avLst>
-              <a:gd name="adj" fmla="val 8528"/>
-            </a:avLst>
-          </a:prstGeom>
-          <a:solidFill>
-            <a:schemeClr val="bg1"/>
-          </a:solidFill>
-          <a:ln>
-            <a:noFill/>
-          </a:ln>
-        </p:spPr>
-        <p:style>
-          <a:lnRef idx="2">
-            <a:schemeClr val="accent1">
-              <a:shade val="15000"/>
-            </a:schemeClr>
-          </a:lnRef>
-          <a:fillRef idx="1">
-            <a:schemeClr val="accent1"/>
-          </a:fillRef>
-          <a:effectRef idx="0">
-            <a:schemeClr val="accent1"/>
-          </a:effectRef>
-          <a:fontRef idx="minor">
-            <a:schemeClr val="lt1"/>
-          </a:fontRef>
-        </p:style>
-        <p:txBody>
-          <a:bodyPr rtlCol="0" anchor="ctr"/>
-          <a:lstStyle/>
-          <a:p>
-            <a:pPr algn="ctr"/>
-            <a:endParaRPr lang="en-US">
-              <a:solidFill>
-                <a:schemeClr val="tx1"/>
-              </a:solidFill>
-            </a:endParaRPr>
-          </a:p>
-        </p:txBody>
-      </p:sp>
-      <p:sp>
-        <p:nvSpPr>
-          <p:cNvPr id="7" name="Donut 6">
-            <a:extLst>
-              <a:ext uri="{FF2B5EF4-FFF2-40B4-BE49-F238E27FC236}">
-                <a16:creationId xmlns:a16="http://schemas.microsoft.com/office/drawing/2014/main" id="{8DF3F0C9-5CF3-E798-334D-031DA0BB3C21}"/>
-              </a:ext>
-            </a:extLst>
-          </p:cNvPr>
-          <p:cNvSpPr/>
-          <p:nvPr/>
-        </p:nvSpPr>
-        <p:spPr>
-          <a:xfrm>
-            <a:off x="5139828" y="2875460"/>
-            <a:ext cx="1045580" cy="1045580"/>
-          </a:xfrm>
-          <a:prstGeom prst="donut">
-            <a:avLst>
-              <a:gd name="adj" fmla="val 22121"/>
-            </a:avLst>
-          </a:prstGeom>
-          <a:solidFill>
-            <a:schemeClr val="bg1"/>
-          </a:solidFill>
-          <a:ln>
-            <a:noFill/>
-          </a:ln>
-        </p:spPr>
-        <p:style>
-          <a:lnRef idx="2">
-            <a:schemeClr val="accent1">
-              <a:shade val="15000"/>
-            </a:schemeClr>
-          </a:lnRef>
-          <a:fillRef idx="1">
-            <a:schemeClr val="accent1"/>
-          </a:fillRef>
-          <a:effectRef idx="0">
-            <a:schemeClr val="accent1"/>
-          </a:effectRef>
-          <a:fontRef idx="minor">
-            <a:schemeClr val="lt1"/>
-          </a:fontRef>
-        </p:style>
-        <p:txBody>
-          <a:bodyPr rtlCol="0" anchor="ctr"/>
-          <a:lstStyle/>
-          <a:p>
-            <a:pPr algn="ctr"/>
-            <a:endParaRPr lang="en-US">
-              <a:solidFill>
-                <a:schemeClr val="tx1"/>
-              </a:solidFill>
-            </a:endParaRPr>
-          </a:p>
-        </p:txBody>
-      </p:sp>
-      <p:sp>
-        <p:nvSpPr>
-          <p:cNvPr id="8" name="Oval 7">
-            <a:extLst>
-              <a:ext uri="{FF2B5EF4-FFF2-40B4-BE49-F238E27FC236}">
-                <a16:creationId xmlns:a16="http://schemas.microsoft.com/office/drawing/2014/main" id="{6DA28AE5-407F-4712-9FC6-931B6E72A418}"/>
-              </a:ext>
-            </a:extLst>
-          </p:cNvPr>
-          <p:cNvSpPr/>
-          <p:nvPr/>
-        </p:nvSpPr>
-        <p:spPr>
-          <a:xfrm>
-            <a:off x="6287008" y="2962656"/>
-            <a:ext cx="235712" cy="235712"/>
-          </a:xfrm>
-          <a:prstGeom prst="ellipse">
+          <a:prstGeom prst="rect">
             <a:avLst/>
           </a:prstGeom>
-          <a:solidFill>
-            <a:schemeClr val="bg1"/>
-          </a:solidFill>
-          <a:ln>
-            <a:noFill/>
-          </a:ln>
+          <a:noFill/>
+          <a:extLst>
+            <a:ext uri="{909E8E84-426E-40DD-AFC4-6F175D3DCCD1}">
+              <a14:hiddenFill xmlns:a14="http://schemas.microsoft.com/office/drawing/2010/main">
+                <a:solidFill>
+                  <a:srgbClr val="FFFFFF"/>
+                </a:solidFill>
+              </a14:hiddenFill>
+            </a:ext>
+          </a:extLst>
         </p:spPr>
-        <p:style>
-          <a:lnRef idx="2">
-            <a:schemeClr val="accent1">
-              <a:shade val="15000"/>
-            </a:schemeClr>
-          </a:lnRef>
-          <a:fillRef idx="1">
-            <a:schemeClr val="accent1"/>
-          </a:fillRef>
-          <a:effectRef idx="0">
-            <a:schemeClr val="accent1"/>
-          </a:effectRef>
-          <a:fontRef idx="minor">
-            <a:schemeClr val="lt1"/>
-          </a:fontRef>
-        </p:style>
-        <p:txBody>
-          <a:bodyPr rtlCol="0" anchor="ctr"/>
-          <a:lstStyle/>
-          <a:p>
-            <a:pPr algn="ctr"/>
-            <a:endParaRPr lang="en-US"/>
-          </a:p>
-        </p:txBody>
-      </p:sp>
-      <p:sp>
-        <p:nvSpPr>
-          <p:cNvPr id="9" name="Arc 8">
-            <a:extLst>
-              <a:ext uri="{FF2B5EF4-FFF2-40B4-BE49-F238E27FC236}">
-                <a16:creationId xmlns:a16="http://schemas.microsoft.com/office/drawing/2014/main" id="{862C2310-9B87-3207-04A3-D666BDA472F4}"/>
-              </a:ext>
-            </a:extLst>
-          </p:cNvPr>
-          <p:cNvSpPr/>
+      </p:pic>
+      <p:grpSp>
+        <p:nvGrpSpPr>
+          <p:cNvPr id="32" name="Group 31">
+            <a:extLst>
+              <a:ext uri="{FF2B5EF4-FFF2-40B4-BE49-F238E27FC236}">
+                <a16:creationId xmlns:a16="http://schemas.microsoft.com/office/drawing/2014/main" id="{4287DD6A-2544-AF5E-555A-26F2E16EF0BC}"/>
+              </a:ext>
+            </a:extLst>
+          </p:cNvPr>
+          <p:cNvGrpSpPr/>
           <p:nvPr/>
-        </p:nvSpPr>
-        <p:spPr>
+        </p:nvGrpSpPr>
+        <p:grpSpPr>
           <a:xfrm>
-            <a:off x="6340476" y="2972943"/>
-            <a:ext cx="559808" cy="582494"/>
+            <a:off x="3447738" y="1296263"/>
+            <a:ext cx="3889094" cy="3964844"/>
+            <a:chOff x="4155311" y="1394234"/>
+            <a:chExt cx="3889094" cy="3964844"/>
           </a:xfrm>
-          <a:prstGeom prst="arc">
-            <a:avLst>
-              <a:gd name="adj1" fmla="val 13277340"/>
-              <a:gd name="adj2" fmla="val 21290250"/>
-            </a:avLst>
-          </a:prstGeom>
-          <a:ln w="238125">
+        </p:grpSpPr>
+        <p:sp>
+          <p:nvSpPr>
+            <p:cNvPr id="31" name="Rounded Rectangle 30">
+              <a:extLst>
+                <a:ext uri="{FF2B5EF4-FFF2-40B4-BE49-F238E27FC236}">
+                  <a16:creationId xmlns:a16="http://schemas.microsoft.com/office/drawing/2014/main" id="{2F364721-9750-67E8-871A-CB0CE99A9221}"/>
+                </a:ext>
+              </a:extLst>
+            </p:cNvPr>
+            <p:cNvSpPr/>
+            <p:nvPr/>
+          </p:nvSpPr>
+          <p:spPr>
+            <a:xfrm>
+              <a:off x="4155311" y="1394234"/>
+              <a:ext cx="3889094" cy="3964844"/>
+            </a:xfrm>
+            <a:prstGeom prst="roundRect">
+              <a:avLst>
+                <a:gd name="adj" fmla="val 22675"/>
+              </a:avLst>
+            </a:prstGeom>
+            <a:gradFill flip="none" rotWithShape="1">
+              <a:gsLst>
+                <a:gs pos="50000">
+                  <a:srgbClr val="2B4091">
+                    <a:lumMod val="76260"/>
+                    <a:lumOff val="23740"/>
+                  </a:srgbClr>
+                </a:gs>
+                <a:gs pos="67000">
+                  <a:srgbClr val="00B0F0">
+                    <a:lumMod val="51000"/>
+                    <a:lumOff val="49000"/>
+                  </a:srgbClr>
+                </a:gs>
+              </a:gsLst>
+              <a:path path="circle">
+                <a:fillToRect l="50000" t="50000" r="50000" b="50000"/>
+              </a:path>
+              <a:tileRect/>
+            </a:gradFill>
+            <a:ln>
+              <a:noFill/>
+            </a:ln>
+          </p:spPr>
+          <p:style>
+            <a:lnRef idx="2">
+              <a:schemeClr val="accent1">
+                <a:shade val="15000"/>
+              </a:schemeClr>
+            </a:lnRef>
+            <a:fillRef idx="1">
+              <a:schemeClr val="accent1"/>
+            </a:fillRef>
+            <a:effectRef idx="0">
+              <a:schemeClr val="accent1"/>
+            </a:effectRef>
+            <a:fontRef idx="minor">
+              <a:schemeClr val="lt1"/>
+            </a:fontRef>
+          </p:style>
+          <p:txBody>
+            <a:bodyPr rtlCol="0" anchor="ctr"/>
+            <a:lstStyle/>
+            <a:p>
+              <a:pPr algn="ctr"/>
+              <a:endParaRPr lang="en-US"/>
+            </a:p>
+          </p:txBody>
+        </p:sp>
+        <p:sp>
+          <p:nvSpPr>
+            <p:cNvPr id="4" name="Donut 3">
+              <a:extLst>
+                <a:ext uri="{FF2B5EF4-FFF2-40B4-BE49-F238E27FC236}">
+                  <a16:creationId xmlns:a16="http://schemas.microsoft.com/office/drawing/2014/main" id="{9919C964-9511-837C-F423-1DDA95B2E374}"/>
+                </a:ext>
+              </a:extLst>
+            </p:cNvPr>
+            <p:cNvSpPr/>
+            <p:nvPr/>
+          </p:nvSpPr>
+          <p:spPr>
+            <a:xfrm>
+              <a:off x="4609475" y="1886055"/>
+              <a:ext cx="2973049" cy="2973049"/>
+            </a:xfrm>
+            <a:prstGeom prst="donut">
+              <a:avLst>
+                <a:gd name="adj" fmla="val 8528"/>
+              </a:avLst>
+            </a:prstGeom>
             <a:solidFill>
               <a:schemeClr val="bg1"/>
             </a:solidFill>
-          </a:ln>
-        </p:spPr>
-        <p:style>
-          <a:lnRef idx="1">
-            <a:schemeClr val="accent1"/>
-          </a:lnRef>
-          <a:fillRef idx="0">
-            <a:schemeClr val="accent1"/>
-          </a:fillRef>
-          <a:effectRef idx="0">
-            <a:schemeClr val="accent1"/>
-          </a:effectRef>
-          <a:fontRef idx="minor">
-            <a:schemeClr val="tx1"/>
-          </a:fontRef>
-        </p:style>
-        <p:txBody>
-          <a:bodyPr rtlCol="0" anchor="ctr"/>
-          <a:lstStyle/>
-          <a:p>
-            <a:pPr algn="ctr"/>
-            <a:endParaRPr lang="en-US"/>
-          </a:p>
-        </p:txBody>
-      </p:sp>
-      <p:sp>
-        <p:nvSpPr>
-          <p:cNvPr id="11" name="Oval 10">
-            <a:extLst>
-              <a:ext uri="{FF2B5EF4-FFF2-40B4-BE49-F238E27FC236}">
-                <a16:creationId xmlns:a16="http://schemas.microsoft.com/office/drawing/2014/main" id="{E2E6D68F-3F1D-8FD5-1C54-FF07D4F0C5AF}"/>
-              </a:ext>
-            </a:extLst>
-          </p:cNvPr>
-          <p:cNvSpPr/>
-          <p:nvPr/>
-        </p:nvSpPr>
-        <p:spPr>
-          <a:xfrm>
-            <a:off x="6272403" y="3675168"/>
-            <a:ext cx="235712" cy="235712"/>
-          </a:xfrm>
-          <a:prstGeom prst="ellipse">
-            <a:avLst/>
-          </a:prstGeom>
-          <a:solidFill>
-            <a:schemeClr val="bg1"/>
-          </a:solidFill>
-          <a:ln>
-            <a:noFill/>
-          </a:ln>
-        </p:spPr>
-        <p:style>
-          <a:lnRef idx="2">
-            <a:schemeClr val="accent1">
-              <a:shade val="15000"/>
-            </a:schemeClr>
-          </a:lnRef>
-          <a:fillRef idx="1">
-            <a:schemeClr val="accent1"/>
-          </a:fillRef>
-          <a:effectRef idx="0">
-            <a:schemeClr val="accent1"/>
-          </a:effectRef>
-          <a:fontRef idx="minor">
-            <a:schemeClr val="lt1"/>
-          </a:fontRef>
-        </p:style>
-        <p:txBody>
-          <a:bodyPr rtlCol="0" anchor="ctr"/>
-          <a:lstStyle/>
-          <a:p>
-            <a:pPr algn="ctr"/>
-            <a:endParaRPr lang="en-US"/>
-          </a:p>
-        </p:txBody>
-      </p:sp>
-      <p:sp>
-        <p:nvSpPr>
-          <p:cNvPr id="12" name="Oval 11">
-            <a:extLst>
-              <a:ext uri="{FF2B5EF4-FFF2-40B4-BE49-F238E27FC236}">
-                <a16:creationId xmlns:a16="http://schemas.microsoft.com/office/drawing/2014/main" id="{2284164F-0650-7DF7-7A90-FDF539950965}"/>
-              </a:ext>
-            </a:extLst>
-          </p:cNvPr>
-          <p:cNvSpPr/>
-          <p:nvPr/>
-        </p:nvSpPr>
-        <p:spPr>
-          <a:xfrm>
-            <a:off x="6766110" y="3675168"/>
-            <a:ext cx="235712" cy="235712"/>
-          </a:xfrm>
-          <a:prstGeom prst="ellipse">
-            <a:avLst/>
-          </a:prstGeom>
-          <a:solidFill>
-            <a:schemeClr val="bg1"/>
-          </a:solidFill>
-          <a:ln>
-            <a:noFill/>
-          </a:ln>
-        </p:spPr>
-        <p:style>
-          <a:lnRef idx="2">
-            <a:schemeClr val="accent1">
-              <a:shade val="15000"/>
-            </a:schemeClr>
-          </a:lnRef>
-          <a:fillRef idx="1">
-            <a:schemeClr val="accent1"/>
-          </a:fillRef>
-          <a:effectRef idx="0">
-            <a:schemeClr val="accent1"/>
-          </a:effectRef>
-          <a:fontRef idx="minor">
-            <a:schemeClr val="lt1"/>
-          </a:fontRef>
-        </p:style>
-        <p:txBody>
-          <a:bodyPr rtlCol="0" anchor="ctr"/>
-          <a:lstStyle/>
-          <a:p>
-            <a:pPr algn="ctr"/>
-            <a:endParaRPr lang="en-US"/>
-          </a:p>
-        </p:txBody>
-      </p:sp>
-      <p:cxnSp>
-        <p:nvCxnSpPr>
-          <p:cNvPr id="14" name="Straight Connector 13">
-            <a:extLst>
-              <a:ext uri="{FF2B5EF4-FFF2-40B4-BE49-F238E27FC236}">
-                <a16:creationId xmlns:a16="http://schemas.microsoft.com/office/drawing/2014/main" id="{C6820E01-404B-AD7C-6E15-FC993CF2EFC3}"/>
-              </a:ext>
-            </a:extLst>
-          </p:cNvPr>
-          <p:cNvCxnSpPr>
-            <a:cxnSpLocks/>
-          </p:cNvCxnSpPr>
-          <p:nvPr/>
-        </p:nvCxnSpPr>
-        <p:spPr>
-          <a:xfrm>
-            <a:off x="6390259" y="3793024"/>
-            <a:ext cx="493707" cy="0"/>
-          </a:xfrm>
-          <a:prstGeom prst="line">
-            <a:avLst/>
-          </a:prstGeom>
-          <a:ln w="234950">
+            <a:ln>
+              <a:noFill/>
+            </a:ln>
+          </p:spPr>
+          <p:style>
+            <a:lnRef idx="2">
+              <a:schemeClr val="accent1">
+                <a:shade val="15000"/>
+              </a:schemeClr>
+            </a:lnRef>
+            <a:fillRef idx="1">
+              <a:schemeClr val="accent1"/>
+            </a:fillRef>
+            <a:effectRef idx="0">
+              <a:schemeClr val="accent1"/>
+            </a:effectRef>
+            <a:fontRef idx="minor">
+              <a:schemeClr val="lt1"/>
+            </a:fontRef>
+          </p:style>
+          <p:txBody>
+            <a:bodyPr rtlCol="0" anchor="ctr"/>
+            <a:lstStyle/>
+            <a:p>
+              <a:pPr algn="ctr"/>
+              <a:endParaRPr lang="en-US">
+                <a:solidFill>
+                  <a:schemeClr val="tx1"/>
+                </a:solidFill>
+              </a:endParaRPr>
+            </a:p>
+          </p:txBody>
+        </p:sp>
+        <p:sp>
+          <p:nvSpPr>
+            <p:cNvPr id="7" name="Donut 6">
+              <a:extLst>
+                <a:ext uri="{FF2B5EF4-FFF2-40B4-BE49-F238E27FC236}">
+                  <a16:creationId xmlns:a16="http://schemas.microsoft.com/office/drawing/2014/main" id="{8DF3F0C9-5CF3-E798-334D-031DA0BB3C21}"/>
+                </a:ext>
+              </a:extLst>
+            </p:cNvPr>
+            <p:cNvSpPr/>
+            <p:nvPr/>
+          </p:nvSpPr>
+          <p:spPr>
+            <a:xfrm>
+              <a:off x="5139828" y="2875460"/>
+              <a:ext cx="1045580" cy="1045580"/>
+            </a:xfrm>
+            <a:prstGeom prst="donut">
+              <a:avLst>
+                <a:gd name="adj" fmla="val 22121"/>
+              </a:avLst>
+            </a:prstGeom>
             <a:solidFill>
               <a:schemeClr val="bg1"/>
             </a:solidFill>
-          </a:ln>
-        </p:spPr>
-        <p:style>
-          <a:lnRef idx="1">
-            <a:schemeClr val="accent1"/>
-          </a:lnRef>
-          <a:fillRef idx="0">
-            <a:schemeClr val="accent1"/>
-          </a:fillRef>
-          <a:effectRef idx="0">
-            <a:schemeClr val="accent1"/>
-          </a:effectRef>
-          <a:fontRef idx="minor">
-            <a:schemeClr val="tx1"/>
-          </a:fontRef>
-        </p:style>
-      </p:cxnSp>
-      <p:cxnSp>
-        <p:nvCxnSpPr>
-          <p:cNvPr id="19" name="Straight Connector 18">
-            <a:extLst>
-              <a:ext uri="{FF2B5EF4-FFF2-40B4-BE49-F238E27FC236}">
-                <a16:creationId xmlns:a16="http://schemas.microsoft.com/office/drawing/2014/main" id="{10A2BDF8-A86C-339B-D9C0-05CF1DA2FBAC}"/>
-              </a:ext>
-            </a:extLst>
-          </p:cNvPr>
-          <p:cNvCxnSpPr>
-            <a:cxnSpLocks/>
-          </p:cNvCxnSpPr>
-          <p:nvPr/>
-        </p:nvCxnSpPr>
-        <p:spPr>
-          <a:xfrm flipV="1">
-            <a:off x="6390259" y="3429000"/>
-            <a:ext cx="420116" cy="364024"/>
-          </a:xfrm>
-          <a:prstGeom prst="line">
-            <a:avLst/>
-          </a:prstGeom>
-          <a:ln w="225425">
+            <a:ln>
+              <a:noFill/>
+            </a:ln>
+          </p:spPr>
+          <p:style>
+            <a:lnRef idx="2">
+              <a:schemeClr val="accent1">
+                <a:shade val="15000"/>
+              </a:schemeClr>
+            </a:lnRef>
+            <a:fillRef idx="1">
+              <a:schemeClr val="accent1"/>
+            </a:fillRef>
+            <a:effectRef idx="0">
+              <a:schemeClr val="accent1"/>
+            </a:effectRef>
+            <a:fontRef idx="minor">
+              <a:schemeClr val="lt1"/>
+            </a:fontRef>
+          </p:style>
+          <p:txBody>
+            <a:bodyPr rtlCol="0" anchor="ctr"/>
+            <a:lstStyle/>
+            <a:p>
+              <a:pPr algn="ctr"/>
+              <a:endParaRPr lang="en-US">
+                <a:solidFill>
+                  <a:schemeClr val="tx1"/>
+                </a:solidFill>
+              </a:endParaRPr>
+            </a:p>
+          </p:txBody>
+        </p:sp>
+        <p:sp>
+          <p:nvSpPr>
+            <p:cNvPr id="8" name="Oval 7">
+              <a:extLst>
+                <a:ext uri="{FF2B5EF4-FFF2-40B4-BE49-F238E27FC236}">
+                  <a16:creationId xmlns:a16="http://schemas.microsoft.com/office/drawing/2014/main" id="{6DA28AE5-407F-4712-9FC6-931B6E72A418}"/>
+                </a:ext>
+              </a:extLst>
+            </p:cNvPr>
+            <p:cNvSpPr/>
+            <p:nvPr/>
+          </p:nvSpPr>
+          <p:spPr>
+            <a:xfrm>
+              <a:off x="6287008" y="2962656"/>
+              <a:ext cx="235712" cy="235712"/>
+            </a:xfrm>
+            <a:prstGeom prst="ellipse">
+              <a:avLst/>
+            </a:prstGeom>
             <a:solidFill>
               <a:schemeClr val="bg1"/>
             </a:solidFill>
-          </a:ln>
-        </p:spPr>
-        <p:style>
-          <a:lnRef idx="1">
-            <a:schemeClr val="accent1"/>
-          </a:lnRef>
-          <a:fillRef idx="0">
-            <a:schemeClr val="accent1"/>
-          </a:fillRef>
-          <a:effectRef idx="0">
-            <a:schemeClr val="accent1"/>
-          </a:effectRef>
-          <a:fontRef idx="minor">
-            <a:schemeClr val="tx1"/>
-          </a:fontRef>
-        </p:style>
-      </p:cxnSp>
-      <p:sp>
-        <p:nvSpPr>
-          <p:cNvPr id="24" name="Arc 23">
-            <a:extLst>
-              <a:ext uri="{FF2B5EF4-FFF2-40B4-BE49-F238E27FC236}">
-                <a16:creationId xmlns:a16="http://schemas.microsoft.com/office/drawing/2014/main" id="{7D1B083F-167C-9E0D-CEBA-E95F7A42A9D9}"/>
-              </a:ext>
-            </a:extLst>
-          </p:cNvPr>
-          <p:cNvSpPr/>
-          <p:nvPr/>
-        </p:nvSpPr>
-        <p:spPr>
-          <a:xfrm rot="3870051">
-            <a:off x="6330195" y="2903309"/>
-            <a:ext cx="580369" cy="607376"/>
-          </a:xfrm>
-          <a:prstGeom prst="arc">
-            <a:avLst>
-              <a:gd name="adj1" fmla="val 19255944"/>
-              <a:gd name="adj2" fmla="val 20866656"/>
-            </a:avLst>
-          </a:prstGeom>
-          <a:ln w="225425">
+            <a:ln>
+              <a:noFill/>
+            </a:ln>
+          </p:spPr>
+          <p:style>
+            <a:lnRef idx="2">
+              <a:schemeClr val="accent1">
+                <a:shade val="15000"/>
+              </a:schemeClr>
+            </a:lnRef>
+            <a:fillRef idx="1">
+              <a:schemeClr val="accent1"/>
+            </a:fillRef>
+            <a:effectRef idx="0">
+              <a:schemeClr val="accent1"/>
+            </a:effectRef>
+            <a:fontRef idx="minor">
+              <a:schemeClr val="lt1"/>
+            </a:fontRef>
+          </p:style>
+          <p:txBody>
+            <a:bodyPr rtlCol="0" anchor="ctr"/>
+            <a:lstStyle/>
+            <a:p>
+              <a:pPr algn="ctr"/>
+              <a:endParaRPr lang="en-US"/>
+            </a:p>
+          </p:txBody>
+        </p:sp>
+        <p:sp>
+          <p:nvSpPr>
+            <p:cNvPr id="9" name="Arc 8">
+              <a:extLst>
+                <a:ext uri="{FF2B5EF4-FFF2-40B4-BE49-F238E27FC236}">
+                  <a16:creationId xmlns:a16="http://schemas.microsoft.com/office/drawing/2014/main" id="{862C2310-9B87-3207-04A3-D666BDA472F4}"/>
+                </a:ext>
+              </a:extLst>
+            </p:cNvPr>
+            <p:cNvSpPr/>
+            <p:nvPr/>
+          </p:nvSpPr>
+          <p:spPr>
+            <a:xfrm>
+              <a:off x="6340476" y="2972943"/>
+              <a:ext cx="559808" cy="582494"/>
+            </a:xfrm>
+            <a:prstGeom prst="arc">
+              <a:avLst>
+                <a:gd name="adj1" fmla="val 13277340"/>
+                <a:gd name="adj2" fmla="val 21290250"/>
+              </a:avLst>
+            </a:prstGeom>
+            <a:ln w="238125">
+              <a:solidFill>
+                <a:schemeClr val="bg1"/>
+              </a:solidFill>
+            </a:ln>
+          </p:spPr>
+          <p:style>
+            <a:lnRef idx="1">
+              <a:schemeClr val="accent1"/>
+            </a:lnRef>
+            <a:fillRef idx="0">
+              <a:schemeClr val="accent1"/>
+            </a:fillRef>
+            <a:effectRef idx="0">
+              <a:schemeClr val="accent1"/>
+            </a:effectRef>
+            <a:fontRef idx="minor">
+              <a:schemeClr val="tx1"/>
+            </a:fontRef>
+          </p:style>
+          <p:txBody>
+            <a:bodyPr rtlCol="0" anchor="ctr"/>
+            <a:lstStyle/>
+            <a:p>
+              <a:pPr algn="ctr"/>
+              <a:endParaRPr lang="en-US"/>
+            </a:p>
+          </p:txBody>
+        </p:sp>
+        <p:sp>
+          <p:nvSpPr>
+            <p:cNvPr id="11" name="Oval 10">
+              <a:extLst>
+                <a:ext uri="{FF2B5EF4-FFF2-40B4-BE49-F238E27FC236}">
+                  <a16:creationId xmlns:a16="http://schemas.microsoft.com/office/drawing/2014/main" id="{E2E6D68F-3F1D-8FD5-1C54-FF07D4F0C5AF}"/>
+                </a:ext>
+              </a:extLst>
+            </p:cNvPr>
+            <p:cNvSpPr/>
+            <p:nvPr/>
+          </p:nvSpPr>
+          <p:spPr>
+            <a:xfrm>
+              <a:off x="6277171" y="3675168"/>
+              <a:ext cx="235712" cy="235712"/>
+            </a:xfrm>
+            <a:prstGeom prst="ellipse">
+              <a:avLst/>
+            </a:prstGeom>
             <a:solidFill>
               <a:schemeClr val="bg1"/>
             </a:solidFill>
-          </a:ln>
-        </p:spPr>
-        <p:style>
-          <a:lnRef idx="1">
-            <a:schemeClr val="accent1"/>
-          </a:lnRef>
-          <a:fillRef idx="0">
-            <a:schemeClr val="accent1"/>
-          </a:fillRef>
-          <a:effectRef idx="0">
-            <a:schemeClr val="accent1"/>
-          </a:effectRef>
-          <a:fontRef idx="minor">
-            <a:schemeClr val="tx1"/>
-          </a:fontRef>
-        </p:style>
-        <p:txBody>
-          <a:bodyPr rtlCol="0" anchor="ctr"/>
-          <a:lstStyle/>
-          <a:p>
-            <a:pPr algn="ctr"/>
-            <a:endParaRPr lang="en-US"/>
-          </a:p>
-        </p:txBody>
-      </p:sp>
-      <p:sp>
-        <p:nvSpPr>
-          <p:cNvPr id="25" name="Arc 24">
-            <a:extLst>
-              <a:ext uri="{FF2B5EF4-FFF2-40B4-BE49-F238E27FC236}">
-                <a16:creationId xmlns:a16="http://schemas.microsoft.com/office/drawing/2014/main" id="{DB382888-9187-A512-6423-04CD6BC454E0}"/>
-              </a:ext>
-            </a:extLst>
-          </p:cNvPr>
-          <p:cNvSpPr/>
-          <p:nvPr/>
-        </p:nvSpPr>
-        <p:spPr>
-          <a:xfrm rot="1977742">
-            <a:off x="6315632" y="2942204"/>
-            <a:ext cx="580369" cy="607376"/>
-          </a:xfrm>
-          <a:prstGeom prst="arc">
-            <a:avLst>
-              <a:gd name="adj1" fmla="val 19255944"/>
-              <a:gd name="adj2" fmla="val 20762519"/>
-            </a:avLst>
-          </a:prstGeom>
-          <a:ln w="234950">
+            <a:ln>
+              <a:noFill/>
+            </a:ln>
+          </p:spPr>
+          <p:style>
+            <a:lnRef idx="2">
+              <a:schemeClr val="accent1">
+                <a:shade val="15000"/>
+              </a:schemeClr>
+            </a:lnRef>
+            <a:fillRef idx="1">
+              <a:schemeClr val="accent1"/>
+            </a:fillRef>
+            <a:effectRef idx="0">
+              <a:schemeClr val="accent1"/>
+            </a:effectRef>
+            <a:fontRef idx="minor">
+              <a:schemeClr val="lt1"/>
+            </a:fontRef>
+          </p:style>
+          <p:txBody>
+            <a:bodyPr rtlCol="0" anchor="ctr"/>
+            <a:lstStyle/>
+            <a:p>
+              <a:pPr algn="ctr"/>
+              <a:endParaRPr lang="en-US"/>
+            </a:p>
+          </p:txBody>
+        </p:sp>
+        <p:sp>
+          <p:nvSpPr>
+            <p:cNvPr id="12" name="Oval 11">
+              <a:extLst>
+                <a:ext uri="{FF2B5EF4-FFF2-40B4-BE49-F238E27FC236}">
+                  <a16:creationId xmlns:a16="http://schemas.microsoft.com/office/drawing/2014/main" id="{2284164F-0650-7DF7-7A90-FDF539950965}"/>
+                </a:ext>
+              </a:extLst>
+            </p:cNvPr>
+            <p:cNvSpPr/>
+            <p:nvPr/>
+          </p:nvSpPr>
+          <p:spPr>
+            <a:xfrm>
+              <a:off x="6766110" y="3675168"/>
+              <a:ext cx="235712" cy="235712"/>
+            </a:xfrm>
+            <a:prstGeom prst="ellipse">
+              <a:avLst/>
+            </a:prstGeom>
             <a:solidFill>
               <a:schemeClr val="bg1"/>
             </a:solidFill>
-          </a:ln>
-        </p:spPr>
-        <p:style>
-          <a:lnRef idx="1">
-            <a:schemeClr val="accent1"/>
-          </a:lnRef>
-          <a:fillRef idx="0">
-            <a:schemeClr val="accent1"/>
-          </a:fillRef>
-          <a:effectRef idx="0">
-            <a:schemeClr val="accent1"/>
-          </a:effectRef>
-          <a:fontRef idx="minor">
-            <a:schemeClr val="tx1"/>
-          </a:fontRef>
-        </p:style>
-        <p:txBody>
-          <a:bodyPr rtlCol="0" anchor="ctr"/>
-          <a:lstStyle/>
-          <a:p>
-            <a:pPr algn="ctr"/>
-            <a:endParaRPr lang="en-US"/>
-          </a:p>
-        </p:txBody>
-      </p:sp>
-      <p:sp>
-        <p:nvSpPr>
-          <p:cNvPr id="26" name="Arc 25">
-            <a:extLst>
-              <a:ext uri="{FF2B5EF4-FFF2-40B4-BE49-F238E27FC236}">
-                <a16:creationId xmlns:a16="http://schemas.microsoft.com/office/drawing/2014/main" id="{EAFFCED4-0A1A-FFC2-A5BA-32593E5929E8}"/>
-              </a:ext>
-            </a:extLst>
-          </p:cNvPr>
-          <p:cNvSpPr/>
-          <p:nvPr/>
-        </p:nvSpPr>
-        <p:spPr>
-          <a:xfrm rot="3028715">
-            <a:off x="6334214" y="2897283"/>
-            <a:ext cx="580369" cy="607376"/>
-          </a:xfrm>
-          <a:prstGeom prst="arc">
-            <a:avLst>
-              <a:gd name="adj1" fmla="val 19894564"/>
-              <a:gd name="adj2" fmla="val 21128056"/>
-            </a:avLst>
-          </a:prstGeom>
-          <a:ln w="228600">
-            <a:solidFill>
-              <a:schemeClr val="bg1"/>
-            </a:solidFill>
-          </a:ln>
-        </p:spPr>
-        <p:style>
-          <a:lnRef idx="1">
-            <a:schemeClr val="accent1"/>
-          </a:lnRef>
-          <a:fillRef idx="0">
-            <a:schemeClr val="accent1"/>
-          </a:fillRef>
-          <a:effectRef idx="0">
-            <a:schemeClr val="accent1"/>
-          </a:effectRef>
-          <a:fontRef idx="minor">
-            <a:schemeClr val="tx1"/>
-          </a:fontRef>
-        </p:style>
-        <p:txBody>
-          <a:bodyPr rtlCol="0" anchor="ctr"/>
-          <a:lstStyle/>
-          <a:p>
-            <a:pPr algn="ctr"/>
-            <a:endParaRPr lang="en-US"/>
-          </a:p>
-        </p:txBody>
-      </p:sp>
-      <p:cxnSp>
-        <p:nvCxnSpPr>
-          <p:cNvPr id="27" name="Straight Connector 26">
-            <a:extLst>
-              <a:ext uri="{FF2B5EF4-FFF2-40B4-BE49-F238E27FC236}">
-                <a16:creationId xmlns:a16="http://schemas.microsoft.com/office/drawing/2014/main" id="{98F9EDBD-EFB2-84A4-7658-672181BCB4E5}"/>
-              </a:ext>
-            </a:extLst>
-          </p:cNvPr>
-          <p:cNvCxnSpPr>
-            <a:cxnSpLocks/>
-          </p:cNvCxnSpPr>
-          <p:nvPr/>
-        </p:nvCxnSpPr>
-        <p:spPr>
-          <a:xfrm flipV="1">
-            <a:off x="6595110" y="3250341"/>
-            <a:ext cx="252594" cy="234955"/>
-          </a:xfrm>
-          <a:prstGeom prst="line">
-            <a:avLst/>
-          </a:prstGeom>
-          <a:ln w="22225">
-            <a:solidFill>
-              <a:schemeClr val="bg1"/>
-            </a:solidFill>
-          </a:ln>
-        </p:spPr>
-        <p:style>
-          <a:lnRef idx="1">
-            <a:schemeClr val="accent1"/>
-          </a:lnRef>
-          <a:fillRef idx="0">
-            <a:schemeClr val="accent1"/>
-          </a:fillRef>
-          <a:effectRef idx="0">
-            <a:schemeClr val="accent1"/>
-          </a:effectRef>
-          <a:fontRef idx="minor">
-            <a:schemeClr val="tx1"/>
-          </a:fontRef>
-        </p:style>
-      </p:cxnSp>
+            <a:ln>
+              <a:noFill/>
+            </a:ln>
+          </p:spPr>
+          <p:style>
+            <a:lnRef idx="2">
+              <a:schemeClr val="accent1">
+                <a:shade val="15000"/>
+              </a:schemeClr>
+            </a:lnRef>
+            <a:fillRef idx="1">
+              <a:schemeClr val="accent1"/>
+            </a:fillRef>
+            <a:effectRef idx="0">
+              <a:schemeClr val="accent1"/>
+            </a:effectRef>
+            <a:fontRef idx="minor">
+              <a:schemeClr val="lt1"/>
+            </a:fontRef>
+          </p:style>
+          <p:txBody>
+            <a:bodyPr rtlCol="0" anchor="ctr"/>
+            <a:lstStyle/>
+            <a:p>
+              <a:pPr algn="ctr"/>
+              <a:endParaRPr lang="en-US"/>
+            </a:p>
+          </p:txBody>
+        </p:sp>
+        <p:cxnSp>
+          <p:nvCxnSpPr>
+            <p:cNvPr id="14" name="Straight Connector 13">
+              <a:extLst>
+                <a:ext uri="{FF2B5EF4-FFF2-40B4-BE49-F238E27FC236}">
+                  <a16:creationId xmlns:a16="http://schemas.microsoft.com/office/drawing/2014/main" id="{C6820E01-404B-AD7C-6E15-FC993CF2EFC3}"/>
+                </a:ext>
+              </a:extLst>
+            </p:cNvPr>
+            <p:cNvCxnSpPr>
+              <a:cxnSpLocks/>
+            </p:cNvCxnSpPr>
+            <p:nvPr/>
+          </p:nvCxnSpPr>
+          <p:spPr>
+            <a:xfrm>
+              <a:off x="6390259" y="3793024"/>
+              <a:ext cx="493707" cy="0"/>
+            </a:xfrm>
+            <a:prstGeom prst="line">
+              <a:avLst/>
+            </a:prstGeom>
+            <a:ln w="234950">
+              <a:solidFill>
+                <a:schemeClr val="bg1"/>
+              </a:solidFill>
+            </a:ln>
+          </p:spPr>
+          <p:style>
+            <a:lnRef idx="1">
+              <a:schemeClr val="accent1"/>
+            </a:lnRef>
+            <a:fillRef idx="0">
+              <a:schemeClr val="accent1"/>
+            </a:fillRef>
+            <a:effectRef idx="0">
+              <a:schemeClr val="accent1"/>
+            </a:effectRef>
+            <a:fontRef idx="minor">
+              <a:schemeClr val="tx1"/>
+            </a:fontRef>
+          </p:style>
+        </p:cxnSp>
+        <p:cxnSp>
+          <p:nvCxnSpPr>
+            <p:cNvPr id="19" name="Straight Connector 18">
+              <a:extLst>
+                <a:ext uri="{FF2B5EF4-FFF2-40B4-BE49-F238E27FC236}">
+                  <a16:creationId xmlns:a16="http://schemas.microsoft.com/office/drawing/2014/main" id="{10A2BDF8-A86C-339B-D9C0-05CF1DA2FBAC}"/>
+                </a:ext>
+              </a:extLst>
+            </p:cNvPr>
+            <p:cNvCxnSpPr>
+              <a:cxnSpLocks/>
+            </p:cNvCxnSpPr>
+            <p:nvPr/>
+          </p:nvCxnSpPr>
+          <p:spPr>
+            <a:xfrm flipV="1">
+              <a:off x="6390259" y="3429000"/>
+              <a:ext cx="420116" cy="364024"/>
+            </a:xfrm>
+            <a:prstGeom prst="line">
+              <a:avLst/>
+            </a:prstGeom>
+            <a:ln w="225425">
+              <a:solidFill>
+                <a:schemeClr val="bg1"/>
+              </a:solidFill>
+            </a:ln>
+          </p:spPr>
+          <p:style>
+            <a:lnRef idx="1">
+              <a:schemeClr val="accent1"/>
+            </a:lnRef>
+            <a:fillRef idx="0">
+              <a:schemeClr val="accent1"/>
+            </a:fillRef>
+            <a:effectRef idx="0">
+              <a:schemeClr val="accent1"/>
+            </a:effectRef>
+            <a:fontRef idx="minor">
+              <a:schemeClr val="tx1"/>
+            </a:fontRef>
+          </p:style>
+        </p:cxnSp>
+        <p:sp>
+          <p:nvSpPr>
+            <p:cNvPr id="24" name="Arc 23">
+              <a:extLst>
+                <a:ext uri="{FF2B5EF4-FFF2-40B4-BE49-F238E27FC236}">
+                  <a16:creationId xmlns:a16="http://schemas.microsoft.com/office/drawing/2014/main" id="{7D1B083F-167C-9E0D-CEBA-E95F7A42A9D9}"/>
+                </a:ext>
+              </a:extLst>
+            </p:cNvPr>
+            <p:cNvSpPr/>
+            <p:nvPr/>
+          </p:nvSpPr>
+          <p:spPr>
+            <a:xfrm rot="3870051">
+              <a:off x="6330195" y="2903309"/>
+              <a:ext cx="580369" cy="607376"/>
+            </a:xfrm>
+            <a:prstGeom prst="arc">
+              <a:avLst>
+                <a:gd name="adj1" fmla="val 19255944"/>
+                <a:gd name="adj2" fmla="val 20866656"/>
+              </a:avLst>
+            </a:prstGeom>
+            <a:ln w="225425">
+              <a:solidFill>
+                <a:schemeClr val="bg1"/>
+              </a:solidFill>
+            </a:ln>
+          </p:spPr>
+          <p:style>
+            <a:lnRef idx="1">
+              <a:schemeClr val="accent1"/>
+            </a:lnRef>
+            <a:fillRef idx="0">
+              <a:schemeClr val="accent1"/>
+            </a:fillRef>
+            <a:effectRef idx="0">
+              <a:schemeClr val="accent1"/>
+            </a:effectRef>
+            <a:fontRef idx="minor">
+              <a:schemeClr val="tx1"/>
+            </a:fontRef>
+          </p:style>
+          <p:txBody>
+            <a:bodyPr rtlCol="0" anchor="ctr"/>
+            <a:lstStyle/>
+            <a:p>
+              <a:pPr algn="ctr"/>
+              <a:endParaRPr lang="en-US"/>
+            </a:p>
+          </p:txBody>
+        </p:sp>
+        <p:sp>
+          <p:nvSpPr>
+            <p:cNvPr id="25" name="Arc 24">
+              <a:extLst>
+                <a:ext uri="{FF2B5EF4-FFF2-40B4-BE49-F238E27FC236}">
+                  <a16:creationId xmlns:a16="http://schemas.microsoft.com/office/drawing/2014/main" id="{DB382888-9187-A512-6423-04CD6BC454E0}"/>
+                </a:ext>
+              </a:extLst>
+            </p:cNvPr>
+            <p:cNvSpPr/>
+            <p:nvPr/>
+          </p:nvSpPr>
+          <p:spPr>
+            <a:xfrm rot="1977742">
+              <a:off x="6315632" y="2942204"/>
+              <a:ext cx="580369" cy="607376"/>
+            </a:xfrm>
+            <a:prstGeom prst="arc">
+              <a:avLst>
+                <a:gd name="adj1" fmla="val 19255944"/>
+                <a:gd name="adj2" fmla="val 20762519"/>
+              </a:avLst>
+            </a:prstGeom>
+            <a:ln w="234950">
+              <a:solidFill>
+                <a:schemeClr val="bg1"/>
+              </a:solidFill>
+            </a:ln>
+          </p:spPr>
+          <p:style>
+            <a:lnRef idx="1">
+              <a:schemeClr val="accent1"/>
+            </a:lnRef>
+            <a:fillRef idx="0">
+              <a:schemeClr val="accent1"/>
+            </a:fillRef>
+            <a:effectRef idx="0">
+              <a:schemeClr val="accent1"/>
+            </a:effectRef>
+            <a:fontRef idx="minor">
+              <a:schemeClr val="tx1"/>
+            </a:fontRef>
+          </p:style>
+          <p:txBody>
+            <a:bodyPr rtlCol="0" anchor="ctr"/>
+            <a:lstStyle/>
+            <a:p>
+              <a:pPr algn="ctr"/>
+              <a:endParaRPr lang="en-US"/>
+            </a:p>
+          </p:txBody>
+        </p:sp>
+        <p:sp>
+          <p:nvSpPr>
+            <p:cNvPr id="26" name="Arc 25">
+              <a:extLst>
+                <a:ext uri="{FF2B5EF4-FFF2-40B4-BE49-F238E27FC236}">
+                  <a16:creationId xmlns:a16="http://schemas.microsoft.com/office/drawing/2014/main" id="{EAFFCED4-0A1A-FFC2-A5BA-32593E5929E8}"/>
+                </a:ext>
+              </a:extLst>
+            </p:cNvPr>
+            <p:cNvSpPr/>
+            <p:nvPr/>
+          </p:nvSpPr>
+          <p:spPr>
+            <a:xfrm rot="3028715">
+              <a:off x="6334214" y="2897283"/>
+              <a:ext cx="580369" cy="607376"/>
+            </a:xfrm>
+            <a:prstGeom prst="arc">
+              <a:avLst>
+                <a:gd name="adj1" fmla="val 19894564"/>
+                <a:gd name="adj2" fmla="val 21128056"/>
+              </a:avLst>
+            </a:prstGeom>
+            <a:ln w="228600">
+              <a:solidFill>
+                <a:schemeClr val="bg1"/>
+              </a:solidFill>
+            </a:ln>
+          </p:spPr>
+          <p:style>
+            <a:lnRef idx="1">
+              <a:schemeClr val="accent1"/>
+            </a:lnRef>
+            <a:fillRef idx="0">
+              <a:schemeClr val="accent1"/>
+            </a:fillRef>
+            <a:effectRef idx="0">
+              <a:schemeClr val="accent1"/>
+            </a:effectRef>
+            <a:fontRef idx="minor">
+              <a:schemeClr val="tx1"/>
+            </a:fontRef>
+          </p:style>
+          <p:txBody>
+            <a:bodyPr rtlCol="0" anchor="ctr"/>
+            <a:lstStyle/>
+            <a:p>
+              <a:pPr algn="ctr"/>
+              <a:endParaRPr lang="en-US"/>
+            </a:p>
+          </p:txBody>
+        </p:sp>
+        <p:cxnSp>
+          <p:nvCxnSpPr>
+            <p:cNvPr id="27" name="Straight Connector 26">
+              <a:extLst>
+                <a:ext uri="{FF2B5EF4-FFF2-40B4-BE49-F238E27FC236}">
+                  <a16:creationId xmlns:a16="http://schemas.microsoft.com/office/drawing/2014/main" id="{98F9EDBD-EFB2-84A4-7658-672181BCB4E5}"/>
+                </a:ext>
+              </a:extLst>
+            </p:cNvPr>
+            <p:cNvCxnSpPr>
+              <a:cxnSpLocks/>
+            </p:cNvCxnSpPr>
+            <p:nvPr/>
+          </p:nvCxnSpPr>
+          <p:spPr>
+            <a:xfrm flipV="1">
+              <a:off x="6595110" y="3250341"/>
+              <a:ext cx="252594" cy="234955"/>
+            </a:xfrm>
+            <a:prstGeom prst="line">
+              <a:avLst/>
+            </a:prstGeom>
+            <a:ln w="22225">
+              <a:solidFill>
+                <a:schemeClr val="bg1"/>
+              </a:solidFill>
+            </a:ln>
+          </p:spPr>
+          <p:style>
+            <a:lnRef idx="1">
+              <a:schemeClr val="accent1"/>
+            </a:lnRef>
+            <a:fillRef idx="0">
+              <a:schemeClr val="accent1"/>
+            </a:fillRef>
+            <a:effectRef idx="0">
+              <a:schemeClr val="accent1"/>
+            </a:effectRef>
+            <a:fontRef idx="minor">
+              <a:schemeClr val="tx1"/>
+            </a:fontRef>
+          </p:style>
+        </p:cxnSp>
+      </p:grpSp>
     </p:spTree>
     <p:extLst>
       <p:ext uri="{BB962C8B-B14F-4D97-AF65-F5344CB8AC3E}">
@@ -4506,6 +4967,98 @@
     <p:extLst>
       <p:ext uri="{BB962C8B-B14F-4D97-AF65-F5344CB8AC3E}">
         <p14:creationId xmlns:p14="http://schemas.microsoft.com/office/powerpoint/2010/main" val="3534658129"/>
+      </p:ext>
+    </p:extLst>
+  </p:cSld>
+  <p:clrMapOvr>
+    <a:masterClrMapping/>
+  </p:clrMapOvr>
+</p:sld>
+</file>
+
+<file path=ppt/slides/slide5.xml><?xml version="1.0" encoding="utf-8"?>
+<p:sld xmlns:a="http://schemas.openxmlformats.org/drawingml/2006/main" xmlns:r="http://schemas.openxmlformats.org/officeDocument/2006/relationships" xmlns:p="http://schemas.openxmlformats.org/presentationml/2006/main">
+  <p:cSld>
+    <p:bg>
+      <p:bgPr>
+        <a:solidFill>
+          <a:srgbClr val="92D050"/>
+        </a:solidFill>
+        <a:effectLst/>
+      </p:bgPr>
+    </p:bg>
+    <p:spTree>
+      <p:nvGrpSpPr>
+        <p:cNvPr id="1" name=""/>
+        <p:cNvGrpSpPr/>
+        <p:nvPr/>
+      </p:nvGrpSpPr>
+      <p:grpSpPr>
+        <a:xfrm>
+          <a:off x="0" y="0"/>
+          <a:ext cx="0" cy="0"/>
+          <a:chOff x="0" y="0"/>
+          <a:chExt cx="0" cy="0"/>
+        </a:xfrm>
+      </p:grpSpPr>
+      <p:sp>
+        <p:nvSpPr>
+          <p:cNvPr id="2" name="Title 1">
+            <a:extLst>
+              <a:ext uri="{FF2B5EF4-FFF2-40B4-BE49-F238E27FC236}">
+                <a16:creationId xmlns:a16="http://schemas.microsoft.com/office/drawing/2014/main" id="{AC87F00C-8571-FFCF-0830-6723E9D25100}"/>
+              </a:ext>
+            </a:extLst>
+          </p:cNvPr>
+          <p:cNvSpPr>
+            <a:spLocks noGrp="1"/>
+          </p:cNvSpPr>
+          <p:nvPr>
+            <p:ph type="title"/>
+          </p:nvPr>
+        </p:nvSpPr>
+        <p:spPr/>
+        <p:txBody>
+          <a:bodyPr/>
+          <a:lstStyle/>
+          <a:p>
+            <a:endParaRPr lang="en-US"/>
+          </a:p>
+        </p:txBody>
+      </p:sp>
+      <p:pic>
+        <p:nvPicPr>
+          <p:cNvPr id="5" name="Content Placeholder 4" descr="A blue and white circle with white text&#10;&#10;Description automatically generated">
+            <a:extLst>
+              <a:ext uri="{FF2B5EF4-FFF2-40B4-BE49-F238E27FC236}">
+                <a16:creationId xmlns:a16="http://schemas.microsoft.com/office/drawing/2014/main" id="{8E920942-1F68-80B2-4824-8025BF658A15}"/>
+              </a:ext>
+            </a:extLst>
+          </p:cNvPr>
+          <p:cNvPicPr>
+            <a:picLocks noGrp="1" noChangeAspect="1"/>
+          </p:cNvPicPr>
+          <p:nvPr>
+            <p:ph idx="1"/>
+          </p:nvPr>
+        </p:nvPicPr>
+        <p:blipFill>
+          <a:blip r:embed="rId2"/>
+          <a:stretch>
+            <a:fillRect/>
+          </a:stretch>
+        </p:blipFill>
+        <p:spPr>
+          <a:xfrm>
+            <a:off x="4152900" y="2020094"/>
+            <a:ext cx="3886200" cy="3962400"/>
+          </a:xfrm>
+        </p:spPr>
+      </p:pic>
+    </p:spTree>
+    <p:extLst>
+      <p:ext uri="{BB962C8B-B14F-4D97-AF65-F5344CB8AC3E}">
+        <p14:creationId xmlns:p14="http://schemas.microsoft.com/office/powerpoint/2010/main" val="1953016838"/>
       </p:ext>
     </p:extLst>
   </p:cSld>

</xml_diff>